<commit_message>
Fixes error in ggplot2 cheatsheet
</commit_message>
<xml_diff>
--- a/powerpoints/data-visualization-2.1.pptx
+++ b/powerpoints/data-visualization-2.1.pptx
@@ -4228,7 +4228,7 @@
               <a:t>a + geom_path(</a:t>
             </a:r>
             <a:r>
-              <a:t>lineend="butt", linejoin="round’, linemitre=1</a:t>
+              <a:t>lineend="butt", linejoin="round", linemitre=1</a:t>
             </a:r>
             <a:r>
               <a:rPr b="1"/>
@@ -12362,7 +12362,7 @@
               <a:t>e + geom_rug(</a:t>
             </a:r>
             <a:r>
-              <a:t>sides = “bl”</a:t>
+              <a:t>sides = "bl"</a:t>
             </a:r>
             <a:r>
               <a:rPr b="1"/>
@@ -12488,7 +12488,7 @@
               </a:defRPr>
             </a:pPr>
             <a:r>
-              <a:t>e &lt;- ggplot(mpg, aes(cty, hwy))</a:t>
+              <a:t>f &lt;- ggplot(mpg, aes(class, hwy))</a:t>
             </a:r>
           </a:p>
         </p:txBody>
@@ -12584,7 +12584,7 @@
               <a:t>f + geom_dotplot(</a:t>
             </a:r>
             <a:r>
-              <a:t>binaxis = “y”, stackdir = “center”</a:t>
+              <a:t>binaxis = "y", stackdir = "center"</a:t>
             </a:r>
             <a:r>
               <a:rPr b="1"/>
@@ -12620,7 +12620,7 @@
               <a:t>f + geom_violin(</a:t>
             </a:r>
             <a:r>
-              <a:t>scale = “area”</a:t>
+              <a:t>scale = "area"</a:t>
             </a:r>
             <a:r>
               <a:rPr b="1"/>

</xml_diff>

<commit_message>
changes character to string
</commit_message>
<xml_diff>
--- a/powerpoints/data-visualization-2.1.pptx
+++ b/powerpoints/data-visualization-2.1.pptx
@@ -35725,7 +35725,7 @@
                 <a:cs typeface="Source Sans Pro Regular"/>
                 <a:sym typeface="Source Sans Pro Regular"/>
               </a:rPr>
-              <a:t> - integer or character (0 = "blank", 1 = "solid", </a:t>
+              <a:t> - integer or string (0 = "blank", 1 = "solid", </a:t>
             </a:r>
             <a:br>
               <a:rPr>
@@ -35792,7 +35792,7 @@
                 <a:cs typeface="Source Sans Pro Regular"/>
                 <a:sym typeface="Source Sans Pro Regular"/>
               </a:rPr>
-              <a:t> - character ("round", "butt", or "square")</a:t>
+              <a:t> - string ("round", "butt", or "square")</a:t>
             </a:r>
             <a:endParaRPr>
               <a:latin typeface="Source Sans Pro Regular"/>
@@ -35825,7 +35825,7 @@
                 <a:cs typeface="Source Sans Pro Regular"/>
                 <a:sym typeface="Source Sans Pro Regular"/>
               </a:rPr>
-              <a:t> - character ("round", "mitre", or "bevel")</a:t>
+              <a:t> - string ("round", "mitre", or "bevel")</a:t>
             </a:r>
             <a:endParaRPr>
               <a:latin typeface="Source Sans Pro Regular"/>

</xml_diff>